<commit_message>
1p2s coupling analizleri ve ltspice modeli
ve matlab dosyaları 2p4s için
</commit_message>
<xml_diff>
--- a/Reports/IMMD/Literature_review2.pptx
+++ b/Reports/IMMD/Literature_review2.pptx
@@ -5,7 +5,7 @@
     <p:sldMasterId id="2147483648" r:id="rId1"/>
   </p:sldMasterIdLst>
   <p:notesMasterIdLst>
-    <p:notesMasterId r:id="rId18"/>
+    <p:notesMasterId r:id="rId24"/>
   </p:notesMasterIdLst>
   <p:sldIdLst>
     <p:sldId id="256" r:id="rId2"/>
@@ -24,6 +24,12 @@
     <p:sldId id="269" r:id="rId15"/>
     <p:sldId id="270" r:id="rId16"/>
     <p:sldId id="271" r:id="rId17"/>
+    <p:sldId id="272" r:id="rId18"/>
+    <p:sldId id="274" r:id="rId19"/>
+    <p:sldId id="276" r:id="rId20"/>
+    <p:sldId id="275" r:id="rId21"/>
+    <p:sldId id="273" r:id="rId22"/>
+    <p:sldId id="277" r:id="rId23"/>
   </p:sldIdLst>
   <p:sldSz cx="12192000" cy="6858000"/>
   <p:notesSz cx="6858000" cy="9144000"/>
@@ -122,6 +128,11 @@
       </a:defRPr>
     </a:lvl9pPr>
   </p:defaultTextStyle>
+  <p:extLst>
+    <p:ext uri="{EFAFB233-063F-42B5-8137-9DF3F51BA10A}">
+      <p15:sldGuideLst xmlns:p15="http://schemas.microsoft.com/office/powerpoint/2012/main"/>
+    </p:ext>
+  </p:extLst>
 </p:presentation>
 </file>
 
@@ -207,7 +218,7 @@
           <a:p>
             <a:fld id="{C9E1BA89-25B1-47F3-99AB-5EF9A92C4E36}" type="datetimeFigureOut">
               <a:rPr lang="en-US" smtClean="0"/>
-              <a:t>4/7/2020</a:t>
+              <a:t>4/8/2020</a:t>
             </a:fld>
             <a:endParaRPr lang="en-US"/>
           </a:p>
@@ -705,7 +716,7 @@
           <a:p>
             <a:fld id="{D57CE41D-2AA7-4CFF-A0DD-7A875334FA59}" type="datetimeFigureOut">
               <a:rPr lang="en-US" smtClean="0"/>
-              <a:t>4/7/2020</a:t>
+              <a:t>4/8/2020</a:t>
             </a:fld>
             <a:endParaRPr lang="en-US"/>
           </a:p>
@@ -903,7 +914,7 @@
           <a:p>
             <a:fld id="{D57CE41D-2AA7-4CFF-A0DD-7A875334FA59}" type="datetimeFigureOut">
               <a:rPr lang="en-US" smtClean="0"/>
-              <a:t>4/7/2020</a:t>
+              <a:t>4/8/2020</a:t>
             </a:fld>
             <a:endParaRPr lang="en-US"/>
           </a:p>
@@ -1111,7 +1122,7 @@
           <a:p>
             <a:fld id="{D57CE41D-2AA7-4CFF-A0DD-7A875334FA59}" type="datetimeFigureOut">
               <a:rPr lang="en-US" smtClean="0"/>
-              <a:t>4/7/2020</a:t>
+              <a:t>4/8/2020</a:t>
             </a:fld>
             <a:endParaRPr lang="en-US"/>
           </a:p>
@@ -1309,7 +1320,7 @@
           <a:p>
             <a:fld id="{D57CE41D-2AA7-4CFF-A0DD-7A875334FA59}" type="datetimeFigureOut">
               <a:rPr lang="en-US" smtClean="0"/>
-              <a:t>4/7/2020</a:t>
+              <a:t>4/8/2020</a:t>
             </a:fld>
             <a:endParaRPr lang="en-US"/>
           </a:p>
@@ -1584,7 +1595,7 @@
           <a:p>
             <a:fld id="{D57CE41D-2AA7-4CFF-A0DD-7A875334FA59}" type="datetimeFigureOut">
               <a:rPr lang="en-US" smtClean="0"/>
-              <a:t>4/7/2020</a:t>
+              <a:t>4/8/2020</a:t>
             </a:fld>
             <a:endParaRPr lang="en-US"/>
           </a:p>
@@ -1849,7 +1860,7 @@
           <a:p>
             <a:fld id="{D57CE41D-2AA7-4CFF-A0DD-7A875334FA59}" type="datetimeFigureOut">
               <a:rPr lang="en-US" smtClean="0"/>
-              <a:t>4/7/2020</a:t>
+              <a:t>4/8/2020</a:t>
             </a:fld>
             <a:endParaRPr lang="en-US"/>
           </a:p>
@@ -2261,7 +2272,7 @@
           <a:p>
             <a:fld id="{D57CE41D-2AA7-4CFF-A0DD-7A875334FA59}" type="datetimeFigureOut">
               <a:rPr lang="en-US" smtClean="0"/>
-              <a:t>4/7/2020</a:t>
+              <a:t>4/8/2020</a:t>
             </a:fld>
             <a:endParaRPr lang="en-US"/>
           </a:p>
@@ -2402,7 +2413,7 @@
           <a:p>
             <a:fld id="{D57CE41D-2AA7-4CFF-A0DD-7A875334FA59}" type="datetimeFigureOut">
               <a:rPr lang="en-US" smtClean="0"/>
-              <a:t>4/7/2020</a:t>
+              <a:t>4/8/2020</a:t>
             </a:fld>
             <a:endParaRPr lang="en-US"/>
           </a:p>
@@ -2515,7 +2526,7 @@
           <a:p>
             <a:fld id="{D57CE41D-2AA7-4CFF-A0DD-7A875334FA59}" type="datetimeFigureOut">
               <a:rPr lang="en-US" smtClean="0"/>
-              <a:t>4/7/2020</a:t>
+              <a:t>4/8/2020</a:t>
             </a:fld>
             <a:endParaRPr lang="en-US"/>
           </a:p>
@@ -2826,7 +2837,7 @@
           <a:p>
             <a:fld id="{D57CE41D-2AA7-4CFF-A0DD-7A875334FA59}" type="datetimeFigureOut">
               <a:rPr lang="en-US" smtClean="0"/>
-              <a:t>4/7/2020</a:t>
+              <a:t>4/8/2020</a:t>
             </a:fld>
             <a:endParaRPr lang="en-US"/>
           </a:p>
@@ -3114,7 +3125,7 @@
           <a:p>
             <a:fld id="{D57CE41D-2AA7-4CFF-A0DD-7A875334FA59}" type="datetimeFigureOut">
               <a:rPr lang="en-US" smtClean="0"/>
-              <a:t>4/7/2020</a:t>
+              <a:t>4/8/2020</a:t>
             </a:fld>
             <a:endParaRPr lang="en-US"/>
           </a:p>
@@ -3355,7 +3366,7 @@
           <a:p>
             <a:fld id="{D57CE41D-2AA7-4CFF-A0DD-7A875334FA59}" type="datetimeFigureOut">
               <a:rPr lang="en-US" smtClean="0"/>
-              <a:t>4/7/2020</a:t>
+              <a:t>4/8/2020</a:t>
             </a:fld>
             <a:endParaRPr lang="en-US"/>
           </a:p>
@@ -5108,8 +5119,8 @@
         </p:blipFill>
         <p:spPr>
           <a:xfrm>
-            <a:off x="208912" y="229913"/>
-            <a:ext cx="9701381" cy="6163014"/>
+            <a:off x="8673105" y="629204"/>
+            <a:ext cx="3518895" cy="2235455"/>
           </a:xfrm>
           <a:prstGeom prst="rect">
             <a:avLst/>
@@ -5130,7 +5141,7 @@
         </p:nvSpPr>
         <p:spPr>
           <a:xfrm>
-            <a:off x="9983274" y="1801796"/>
+            <a:off x="9735398" y="3264836"/>
             <a:ext cx="2322490" cy="2308324"/>
           </a:xfrm>
           <a:prstGeom prst="rect">
@@ -5190,8 +5201,8 @@
         </p:blipFill>
         <p:spPr>
           <a:xfrm>
-            <a:off x="9589026" y="4561060"/>
-            <a:ext cx="2394062" cy="2021586"/>
+            <a:off x="542465" y="0"/>
+            <a:ext cx="7544048" cy="6370320"/>
           </a:xfrm>
           <a:prstGeom prst="rect">
             <a:avLst/>
@@ -5657,6 +5668,454 @@
 </p:sld>
 </file>
 
+<file path=ppt/slides/slide17.xml><?xml version="1.0" encoding="utf-8"?>
+<p:sld xmlns:a="http://schemas.openxmlformats.org/drawingml/2006/main" xmlns:r="http://schemas.openxmlformats.org/officeDocument/2006/relationships" xmlns:p="http://schemas.openxmlformats.org/presentationml/2006/main">
+  <p:cSld>
+    <p:spTree>
+      <p:nvGrpSpPr>
+        <p:cNvPr id="1" name=""/>
+        <p:cNvGrpSpPr/>
+        <p:nvPr/>
+      </p:nvGrpSpPr>
+      <p:grpSpPr>
+        <a:xfrm>
+          <a:off x="0" y="0"/>
+          <a:ext cx="0" cy="0"/>
+          <a:chOff x="0" y="0"/>
+          <a:chExt cx="0" cy="0"/>
+        </a:xfrm>
+      </p:grpSpPr>
+      <p:sp>
+        <p:nvSpPr>
+          <p:cNvPr id="2" name="Title 1">
+            <a:extLst>
+              <a:ext uri="{FF2B5EF4-FFF2-40B4-BE49-F238E27FC236}">
+                <a16:creationId xmlns:a16="http://schemas.microsoft.com/office/drawing/2014/main" id="{0696B637-7EF5-41E6-963A-5F2BA2E72A4D}"/>
+              </a:ext>
+            </a:extLst>
+          </p:cNvPr>
+          <p:cNvSpPr>
+            <a:spLocks noGrp="1"/>
+          </p:cNvSpPr>
+          <p:nvPr>
+            <p:ph type="title"/>
+          </p:nvPr>
+        </p:nvSpPr>
+        <p:spPr/>
+        <p:txBody>
+          <a:bodyPr>
+            <a:normAutofit/>
+          </a:bodyPr>
+          <a:lstStyle/>
+          <a:p>
+            <a:r>
+              <a:rPr lang="tr-TR" sz="2200" dirty="0">
+                <a:hlinkClick r:id="rId2"/>
+              </a:rPr>
+              <a:t>A</a:t>
+            </a:r>
+            <a:r>
+              <a:rPr lang="en-US" sz="2200" dirty="0" err="1">
+                <a:hlinkClick r:id="rId2"/>
+              </a:rPr>
+              <a:t>nalysis</a:t>
+            </a:r>
+            <a:r>
+              <a:rPr lang="en-US" sz="2200" dirty="0">
+                <a:hlinkClick r:id="rId2"/>
+              </a:rPr>
+              <a:t> of the DC-Link Current for the Single Phase H-Bridge Inverter Under Harmonic Output Currents </a:t>
+            </a:r>
+            <a:br>
+              <a:rPr lang="en-US" dirty="0"/>
+            </a:br>
+            <a:endParaRPr lang="en-US" dirty="0"/>
+          </a:p>
+        </p:txBody>
+      </p:sp>
+      <p:sp>
+        <p:nvSpPr>
+          <p:cNvPr id="3" name="Content Placeholder 2">
+            <a:extLst>
+              <a:ext uri="{FF2B5EF4-FFF2-40B4-BE49-F238E27FC236}">
+                <a16:creationId xmlns:a16="http://schemas.microsoft.com/office/drawing/2014/main" id="{023F9986-BBF9-46F3-B10E-3F5E37E11D21}"/>
+              </a:ext>
+            </a:extLst>
+          </p:cNvPr>
+          <p:cNvSpPr>
+            <a:spLocks noGrp="1"/>
+          </p:cNvSpPr>
+          <p:nvPr>
+            <p:ph idx="1"/>
+          </p:nvPr>
+        </p:nvSpPr>
+        <p:spPr/>
+        <p:txBody>
+          <a:bodyPr/>
+          <a:lstStyle/>
+          <a:p>
+            <a:r>
+              <a:rPr lang="tr-TR" dirty="0"/>
+              <a:t>LOH </a:t>
+            </a:r>
+            <a:r>
+              <a:rPr lang="tr-TR" dirty="0">
+                <a:sym typeface="Wingdings" panose="05000000000000000000" pitchFamily="2" charset="2"/>
+              </a:rPr>
+              <a:t> </a:t>
+            </a:r>
+            <a:r>
+              <a:rPr lang="tr-TR" dirty="0" err="1">
+                <a:sym typeface="Wingdings" panose="05000000000000000000" pitchFamily="2" charset="2"/>
+              </a:rPr>
+              <a:t>Low</a:t>
+            </a:r>
+            <a:r>
+              <a:rPr lang="tr-TR" dirty="0">
+                <a:sym typeface="Wingdings" panose="05000000000000000000" pitchFamily="2" charset="2"/>
+              </a:rPr>
+              <a:t> </a:t>
+            </a:r>
+            <a:r>
+              <a:rPr lang="tr-TR" dirty="0" err="1">
+                <a:sym typeface="Wingdings" panose="05000000000000000000" pitchFamily="2" charset="2"/>
+              </a:rPr>
+              <a:t>order</a:t>
+            </a:r>
+            <a:r>
+              <a:rPr lang="tr-TR" dirty="0">
+                <a:sym typeface="Wingdings" panose="05000000000000000000" pitchFamily="2" charset="2"/>
+              </a:rPr>
+              <a:t> </a:t>
+            </a:r>
+            <a:r>
+              <a:rPr lang="tr-TR" dirty="0" err="1">
+                <a:sym typeface="Wingdings" panose="05000000000000000000" pitchFamily="2" charset="2"/>
+              </a:rPr>
+              <a:t>harmonics</a:t>
+            </a:r>
+            <a:r>
+              <a:rPr lang="tr-TR" dirty="0">
+                <a:sym typeface="Wingdings" panose="05000000000000000000" pitchFamily="2" charset="2"/>
+              </a:rPr>
+              <a:t>  </a:t>
+            </a:r>
+          </a:p>
+          <a:p>
+            <a:r>
+              <a:rPr lang="tr-TR" dirty="0">
+                <a:sym typeface="Wingdings" panose="05000000000000000000" pitchFamily="2" charset="2"/>
+              </a:rPr>
+              <a:t>SHC   </a:t>
+            </a:r>
+            <a:r>
+              <a:rPr lang="tr-TR" dirty="0" err="1">
+                <a:sym typeface="Wingdings" panose="05000000000000000000" pitchFamily="2" charset="2"/>
+              </a:rPr>
+              <a:t>Switching</a:t>
+            </a:r>
+            <a:r>
+              <a:rPr lang="tr-TR" dirty="0">
+                <a:sym typeface="Wingdings" panose="05000000000000000000" pitchFamily="2" charset="2"/>
+              </a:rPr>
+              <a:t> </a:t>
+            </a:r>
+            <a:r>
+              <a:rPr lang="tr-TR" dirty="0" err="1">
+                <a:sym typeface="Wingdings" panose="05000000000000000000" pitchFamily="2" charset="2"/>
+              </a:rPr>
+              <a:t>Harmonics</a:t>
+            </a:r>
+            <a:endParaRPr lang="en-US" dirty="0"/>
+          </a:p>
+        </p:txBody>
+      </p:sp>
+      <p:pic>
+        <p:nvPicPr>
+          <p:cNvPr id="4" name="Picture 3">
+            <a:extLst>
+              <a:ext uri="{FF2B5EF4-FFF2-40B4-BE49-F238E27FC236}">
+                <a16:creationId xmlns:a16="http://schemas.microsoft.com/office/drawing/2014/main" id="{9B46A2BE-5589-4C23-A859-9A3BC359ACAE}"/>
+              </a:ext>
+            </a:extLst>
+          </p:cNvPr>
+          <p:cNvPicPr>
+            <a:picLocks noChangeAspect="1"/>
+          </p:cNvPicPr>
+          <p:nvPr/>
+        </p:nvPicPr>
+        <p:blipFill>
+          <a:blip r:embed="rId3"/>
+          <a:stretch>
+            <a:fillRect/>
+          </a:stretch>
+        </p:blipFill>
+        <p:spPr>
+          <a:xfrm>
+            <a:off x="6579789" y="1378040"/>
+            <a:ext cx="4774011" cy="3853264"/>
+          </a:xfrm>
+          <a:prstGeom prst="rect">
+            <a:avLst/>
+          </a:prstGeom>
+        </p:spPr>
+      </p:pic>
+      <p:pic>
+        <p:nvPicPr>
+          <p:cNvPr id="5" name="Picture 4">
+            <a:extLst>
+              <a:ext uri="{FF2B5EF4-FFF2-40B4-BE49-F238E27FC236}">
+                <a16:creationId xmlns:a16="http://schemas.microsoft.com/office/drawing/2014/main" id="{2FC499EE-BD60-4666-833D-408BEDD3CB60}"/>
+              </a:ext>
+            </a:extLst>
+          </p:cNvPr>
+          <p:cNvPicPr>
+            <a:picLocks noChangeAspect="1"/>
+          </p:cNvPicPr>
+          <p:nvPr/>
+        </p:nvPicPr>
+        <p:blipFill>
+          <a:blip r:embed="rId4"/>
+          <a:stretch>
+            <a:fillRect/>
+          </a:stretch>
+        </p:blipFill>
+        <p:spPr>
+          <a:xfrm>
+            <a:off x="946128" y="3515932"/>
+            <a:ext cx="5386096" cy="2117078"/>
+          </a:xfrm>
+          <a:prstGeom prst="rect">
+            <a:avLst/>
+          </a:prstGeom>
+        </p:spPr>
+      </p:pic>
+    </p:spTree>
+    <p:extLst>
+      <p:ext uri="{BB962C8B-B14F-4D97-AF65-F5344CB8AC3E}">
+        <p14:creationId xmlns:p14="http://schemas.microsoft.com/office/powerpoint/2010/main" val="1000091148"/>
+      </p:ext>
+    </p:extLst>
+  </p:cSld>
+  <p:clrMapOvr>
+    <a:masterClrMapping/>
+  </p:clrMapOvr>
+</p:sld>
+</file>
+
+<file path=ppt/slides/slide18.xml><?xml version="1.0" encoding="utf-8"?>
+<p:sld xmlns:a="http://schemas.openxmlformats.org/drawingml/2006/main" xmlns:r="http://schemas.openxmlformats.org/officeDocument/2006/relationships" xmlns:p="http://schemas.openxmlformats.org/presentationml/2006/main">
+  <p:cSld>
+    <p:spTree>
+      <p:nvGrpSpPr>
+        <p:cNvPr id="1" name=""/>
+        <p:cNvGrpSpPr/>
+        <p:nvPr/>
+      </p:nvGrpSpPr>
+      <p:grpSpPr>
+        <a:xfrm>
+          <a:off x="0" y="0"/>
+          <a:ext cx="0" cy="0"/>
+          <a:chOff x="0" y="0"/>
+          <a:chExt cx="0" cy="0"/>
+        </a:xfrm>
+      </p:grpSpPr>
+      <p:pic>
+        <p:nvPicPr>
+          <p:cNvPr id="4" name="Picture 3">
+            <a:extLst>
+              <a:ext uri="{FF2B5EF4-FFF2-40B4-BE49-F238E27FC236}">
+                <a16:creationId xmlns:a16="http://schemas.microsoft.com/office/drawing/2014/main" id="{DFB56205-53C3-42BE-B1DF-10E4D581E03C}"/>
+              </a:ext>
+            </a:extLst>
+          </p:cNvPr>
+          <p:cNvPicPr>
+            <a:picLocks noChangeAspect="1"/>
+          </p:cNvPicPr>
+          <p:nvPr/>
+        </p:nvPicPr>
+        <p:blipFill>
+          <a:blip r:embed="rId2"/>
+          <a:stretch>
+            <a:fillRect/>
+          </a:stretch>
+        </p:blipFill>
+        <p:spPr>
+          <a:xfrm>
+            <a:off x="1204175" y="90153"/>
+            <a:ext cx="10109546" cy="2668192"/>
+          </a:xfrm>
+          <a:prstGeom prst="rect">
+            <a:avLst/>
+          </a:prstGeom>
+        </p:spPr>
+      </p:pic>
+    </p:spTree>
+    <p:extLst>
+      <p:ext uri="{BB962C8B-B14F-4D97-AF65-F5344CB8AC3E}">
+        <p14:creationId xmlns:p14="http://schemas.microsoft.com/office/powerpoint/2010/main" val="629026436"/>
+      </p:ext>
+    </p:extLst>
+  </p:cSld>
+  <p:clrMapOvr>
+    <a:masterClrMapping/>
+  </p:clrMapOvr>
+</p:sld>
+</file>
+
+<file path=ppt/slides/slide19.xml><?xml version="1.0" encoding="utf-8"?>
+<p:sld xmlns:a="http://schemas.openxmlformats.org/drawingml/2006/main" xmlns:r="http://schemas.openxmlformats.org/officeDocument/2006/relationships" xmlns:p="http://schemas.openxmlformats.org/presentationml/2006/main">
+  <p:cSld>
+    <p:spTree>
+      <p:nvGrpSpPr>
+        <p:cNvPr id="1" name=""/>
+        <p:cNvGrpSpPr/>
+        <p:nvPr/>
+      </p:nvGrpSpPr>
+      <p:grpSpPr>
+        <a:xfrm>
+          <a:off x="0" y="0"/>
+          <a:ext cx="0" cy="0"/>
+          <a:chOff x="0" y="0"/>
+          <a:chExt cx="0" cy="0"/>
+        </a:xfrm>
+      </p:grpSpPr>
+      <p:sp>
+        <p:nvSpPr>
+          <p:cNvPr id="2" name="Title 1">
+            <a:extLst>
+              <a:ext uri="{FF2B5EF4-FFF2-40B4-BE49-F238E27FC236}">
+                <a16:creationId xmlns:a16="http://schemas.microsoft.com/office/drawing/2014/main" id="{E3BA5EC4-BEF2-469D-897C-9038D52AB06F}"/>
+              </a:ext>
+            </a:extLst>
+          </p:cNvPr>
+          <p:cNvSpPr>
+            <a:spLocks noGrp="1"/>
+          </p:cNvSpPr>
+          <p:nvPr>
+            <p:ph type="title"/>
+          </p:nvPr>
+        </p:nvSpPr>
+        <p:spPr/>
+        <p:txBody>
+          <a:bodyPr/>
+          <a:lstStyle/>
+          <a:p>
+            <a:r>
+              <a:rPr lang="en-US" dirty="0">
+                <a:hlinkClick r:id="rId2"/>
+              </a:rPr>
+              <a:t>A DC Bus Capacitor Design Method for Various Inverter Applications </a:t>
+            </a:r>
+            <a:endParaRPr lang="en-US" dirty="0"/>
+          </a:p>
+        </p:txBody>
+      </p:sp>
+      <p:pic>
+        <p:nvPicPr>
+          <p:cNvPr id="4" name="Content Placeholder 3">
+            <a:extLst>
+              <a:ext uri="{FF2B5EF4-FFF2-40B4-BE49-F238E27FC236}">
+                <a16:creationId xmlns:a16="http://schemas.microsoft.com/office/drawing/2014/main" id="{219738CA-4C78-497E-97C6-97EF128E392A}"/>
+              </a:ext>
+            </a:extLst>
+          </p:cNvPr>
+          <p:cNvPicPr>
+            <a:picLocks noGrp="1" noChangeAspect="1"/>
+          </p:cNvPicPr>
+          <p:nvPr>
+            <p:ph idx="1"/>
+          </p:nvPr>
+        </p:nvPicPr>
+        <p:blipFill>
+          <a:blip r:embed="rId3"/>
+          <a:stretch>
+            <a:fillRect/>
+          </a:stretch>
+        </p:blipFill>
+        <p:spPr>
+          <a:xfrm>
+            <a:off x="424197" y="1761230"/>
+            <a:ext cx="5380686" cy="4351338"/>
+          </a:xfrm>
+          <a:prstGeom prst="rect">
+            <a:avLst/>
+          </a:prstGeom>
+        </p:spPr>
+      </p:pic>
+      <p:pic>
+        <p:nvPicPr>
+          <p:cNvPr id="5" name="Picture 4">
+            <a:extLst>
+              <a:ext uri="{FF2B5EF4-FFF2-40B4-BE49-F238E27FC236}">
+                <a16:creationId xmlns:a16="http://schemas.microsoft.com/office/drawing/2014/main" id="{D3D4982B-BE53-4FEB-9A0E-89F8AFC89B29}"/>
+              </a:ext>
+            </a:extLst>
+          </p:cNvPr>
+          <p:cNvPicPr>
+            <a:picLocks noChangeAspect="1"/>
+          </p:cNvPicPr>
+          <p:nvPr/>
+        </p:nvPicPr>
+        <p:blipFill>
+          <a:blip r:embed="rId4"/>
+          <a:stretch>
+            <a:fillRect/>
+          </a:stretch>
+        </p:blipFill>
+        <p:spPr>
+          <a:xfrm>
+            <a:off x="7397101" y="1852411"/>
+            <a:ext cx="2562225" cy="1066800"/>
+          </a:xfrm>
+          <a:prstGeom prst="rect">
+            <a:avLst/>
+          </a:prstGeom>
+        </p:spPr>
+      </p:pic>
+      <p:pic>
+        <p:nvPicPr>
+          <p:cNvPr id="6" name="Picture 5">
+            <a:extLst>
+              <a:ext uri="{FF2B5EF4-FFF2-40B4-BE49-F238E27FC236}">
+                <a16:creationId xmlns:a16="http://schemas.microsoft.com/office/drawing/2014/main" id="{53069F9B-FEE2-426F-93A5-9CF4A44D6F78}"/>
+              </a:ext>
+            </a:extLst>
+          </p:cNvPr>
+          <p:cNvPicPr>
+            <a:picLocks noChangeAspect="1"/>
+          </p:cNvPicPr>
+          <p:nvPr/>
+        </p:nvPicPr>
+        <p:blipFill>
+          <a:blip r:embed="rId5"/>
+          <a:stretch>
+            <a:fillRect/>
+          </a:stretch>
+        </p:blipFill>
+        <p:spPr>
+          <a:xfrm>
+            <a:off x="6506380" y="3161802"/>
+            <a:ext cx="4338034" cy="3226119"/>
+          </a:xfrm>
+          <a:prstGeom prst="rect">
+            <a:avLst/>
+          </a:prstGeom>
+        </p:spPr>
+      </p:pic>
+    </p:spTree>
+    <p:extLst>
+      <p:ext uri="{BB962C8B-B14F-4D97-AF65-F5344CB8AC3E}">
+        <p14:creationId xmlns:p14="http://schemas.microsoft.com/office/powerpoint/2010/main" val="1418102980"/>
+      </p:ext>
+    </p:extLst>
+  </p:cSld>
+  <p:clrMapOvr>
+    <a:masterClrMapping/>
+  </p:clrMapOvr>
+</p:sld>
+</file>
+
 <file path=ppt/slides/slide2.xml><?xml version="1.0" encoding="utf-8"?>
 <p:sld xmlns:a="http://schemas.openxmlformats.org/drawingml/2006/main" xmlns:r="http://schemas.openxmlformats.org/officeDocument/2006/relationships" xmlns:p="http://schemas.openxmlformats.org/presentationml/2006/main">
   <p:cSld>
@@ -6027,6 +6486,1688 @@
     <p:extLst>
       <p:ext uri="{BB962C8B-B14F-4D97-AF65-F5344CB8AC3E}">
         <p14:creationId xmlns:p14="http://schemas.microsoft.com/office/powerpoint/2010/main" val="3673730131"/>
+      </p:ext>
+    </p:extLst>
+  </p:cSld>
+  <p:clrMapOvr>
+    <a:masterClrMapping/>
+  </p:clrMapOvr>
+</p:sld>
+</file>
+
+<file path=ppt/slides/slide20.xml><?xml version="1.0" encoding="utf-8"?>
+<p:sld xmlns:a="http://schemas.openxmlformats.org/drawingml/2006/main" xmlns:r="http://schemas.openxmlformats.org/officeDocument/2006/relationships" xmlns:p="http://schemas.openxmlformats.org/presentationml/2006/main">
+  <p:cSld>
+    <p:spTree>
+      <p:nvGrpSpPr>
+        <p:cNvPr id="1" name=""/>
+        <p:cNvGrpSpPr/>
+        <p:nvPr/>
+      </p:nvGrpSpPr>
+      <p:grpSpPr>
+        <a:xfrm>
+          <a:off x="0" y="0"/>
+          <a:ext cx="0" cy="0"/>
+          <a:chOff x="0" y="0"/>
+          <a:chExt cx="0" cy="0"/>
+        </a:xfrm>
+      </p:grpSpPr>
+      <p:sp>
+        <p:nvSpPr>
+          <p:cNvPr id="2" name="Title 1">
+            <a:extLst>
+              <a:ext uri="{FF2B5EF4-FFF2-40B4-BE49-F238E27FC236}">
+                <a16:creationId xmlns:a16="http://schemas.microsoft.com/office/drawing/2014/main" id="{C317DA50-4F40-4132-9E4D-866BC63D8398}"/>
+              </a:ext>
+            </a:extLst>
+          </p:cNvPr>
+          <p:cNvSpPr>
+            <a:spLocks noGrp="1"/>
+          </p:cNvSpPr>
+          <p:nvPr>
+            <p:ph type="title"/>
+          </p:nvPr>
+        </p:nvSpPr>
+        <p:spPr/>
+        <p:txBody>
+          <a:bodyPr>
+            <a:noAutofit/>
+          </a:bodyPr>
+          <a:lstStyle/>
+          <a:p>
+            <a:r>
+              <a:rPr lang="tr-TR" sz="3600" dirty="0">
+                <a:hlinkClick r:id="rId2"/>
+              </a:rPr>
+              <a:t>A</a:t>
+            </a:r>
+            <a:r>
+              <a:rPr lang="en-US" sz="3600" dirty="0" err="1">
+                <a:hlinkClick r:id="rId2"/>
+              </a:rPr>
+              <a:t>nalysis</a:t>
+            </a:r>
+            <a:r>
+              <a:rPr lang="en-US" sz="3600" dirty="0">
+                <a:hlinkClick r:id="rId2"/>
+              </a:rPr>
+              <a:t> and Characterization of DC Bus Ripple Current of Two-Level Inverters Using The Equivalent Centered Harmonic Approach </a:t>
+            </a:r>
+            <a:endParaRPr lang="en-US" sz="3600" dirty="0"/>
+          </a:p>
+        </p:txBody>
+      </p:sp>
+      <p:pic>
+        <p:nvPicPr>
+          <p:cNvPr id="4" name="Content Placeholder 3">
+            <a:extLst>
+              <a:ext uri="{FF2B5EF4-FFF2-40B4-BE49-F238E27FC236}">
+                <a16:creationId xmlns:a16="http://schemas.microsoft.com/office/drawing/2014/main" id="{B98B759C-9344-4D6A-983A-34B4DFDC3E48}"/>
+              </a:ext>
+            </a:extLst>
+          </p:cNvPr>
+          <p:cNvPicPr>
+            <a:picLocks noGrp="1" noChangeAspect="1"/>
+          </p:cNvPicPr>
+          <p:nvPr>
+            <p:ph idx="1"/>
+          </p:nvPr>
+        </p:nvPicPr>
+        <p:blipFill>
+          <a:blip r:embed="rId3"/>
+          <a:stretch>
+            <a:fillRect/>
+          </a:stretch>
+        </p:blipFill>
+        <p:spPr>
+          <a:xfrm>
+            <a:off x="720479" y="2002665"/>
+            <a:ext cx="4173494" cy="2198586"/>
+          </a:xfrm>
+          <a:prstGeom prst="rect">
+            <a:avLst/>
+          </a:prstGeom>
+        </p:spPr>
+      </p:pic>
+      <p:pic>
+        <p:nvPicPr>
+          <p:cNvPr id="5" name="Picture 4">
+            <a:extLst>
+              <a:ext uri="{FF2B5EF4-FFF2-40B4-BE49-F238E27FC236}">
+                <a16:creationId xmlns:a16="http://schemas.microsoft.com/office/drawing/2014/main" id="{15CF96E6-0A3B-4C8E-9BF3-804AC05C01A4}"/>
+              </a:ext>
+            </a:extLst>
+          </p:cNvPr>
+          <p:cNvPicPr>
+            <a:picLocks noChangeAspect="1"/>
+          </p:cNvPicPr>
+          <p:nvPr/>
+        </p:nvPicPr>
+        <p:blipFill>
+          <a:blip r:embed="rId4"/>
+          <a:stretch>
+            <a:fillRect/>
+          </a:stretch>
+        </p:blipFill>
+        <p:spPr>
+          <a:xfrm>
+            <a:off x="6767177" y="2126583"/>
+            <a:ext cx="4031758" cy="1635524"/>
+          </a:xfrm>
+          <a:prstGeom prst="rect">
+            <a:avLst/>
+          </a:prstGeom>
+        </p:spPr>
+      </p:pic>
+      <p:pic>
+        <p:nvPicPr>
+          <p:cNvPr id="6" name="Picture 5">
+            <a:extLst>
+              <a:ext uri="{FF2B5EF4-FFF2-40B4-BE49-F238E27FC236}">
+                <a16:creationId xmlns:a16="http://schemas.microsoft.com/office/drawing/2014/main" id="{658E722C-AA9C-4105-B3B2-326AC149E5D4}"/>
+              </a:ext>
+            </a:extLst>
+          </p:cNvPr>
+          <p:cNvPicPr>
+            <a:picLocks noChangeAspect="1"/>
+          </p:cNvPicPr>
+          <p:nvPr/>
+        </p:nvPicPr>
+        <p:blipFill>
+          <a:blip r:embed="rId5"/>
+          <a:stretch>
+            <a:fillRect/>
+          </a:stretch>
+        </p:blipFill>
+        <p:spPr>
+          <a:xfrm>
+            <a:off x="5157152" y="4378817"/>
+            <a:ext cx="6741853" cy="2026142"/>
+          </a:xfrm>
+          <a:prstGeom prst="rect">
+            <a:avLst/>
+          </a:prstGeom>
+        </p:spPr>
+      </p:pic>
+    </p:spTree>
+    <p:extLst>
+      <p:ext uri="{BB962C8B-B14F-4D97-AF65-F5344CB8AC3E}">
+        <p14:creationId xmlns:p14="http://schemas.microsoft.com/office/powerpoint/2010/main" val="2120620232"/>
+      </p:ext>
+    </p:extLst>
+  </p:cSld>
+  <p:clrMapOvr>
+    <a:masterClrMapping/>
+  </p:clrMapOvr>
+</p:sld>
+</file>
+
+<file path=ppt/slides/slide21.xml><?xml version="1.0" encoding="utf-8"?>
+<p:sld xmlns:a="http://schemas.openxmlformats.org/drawingml/2006/main" xmlns:r="http://schemas.openxmlformats.org/officeDocument/2006/relationships" xmlns:p="http://schemas.openxmlformats.org/presentationml/2006/main">
+  <p:cSld>
+    <p:spTree>
+      <p:nvGrpSpPr>
+        <p:cNvPr id="1" name=""/>
+        <p:cNvGrpSpPr/>
+        <p:nvPr/>
+      </p:nvGrpSpPr>
+      <p:grpSpPr>
+        <a:xfrm>
+          <a:off x="0" y="0"/>
+          <a:ext cx="0" cy="0"/>
+          <a:chOff x="0" y="0"/>
+          <a:chExt cx="0" cy="0"/>
+        </a:xfrm>
+      </p:grpSpPr>
+      <p:sp>
+        <p:nvSpPr>
+          <p:cNvPr id="6" name="Oval 5">
+            <a:extLst>
+              <a:ext uri="{FF2B5EF4-FFF2-40B4-BE49-F238E27FC236}">
+                <a16:creationId xmlns:a16="http://schemas.microsoft.com/office/drawing/2014/main" id="{CD186AF5-3B00-4BEE-B8F0-3DE3E6F6166D}"/>
+              </a:ext>
+            </a:extLst>
+          </p:cNvPr>
+          <p:cNvSpPr/>
+          <p:nvPr/>
+        </p:nvSpPr>
+        <p:spPr>
+          <a:xfrm>
+            <a:off x="4481848" y="289775"/>
+            <a:ext cx="1790163" cy="920839"/>
+          </a:xfrm>
+          <a:prstGeom prst="ellipse">
+            <a:avLst/>
+          </a:prstGeom>
+        </p:spPr>
+        <p:style>
+          <a:lnRef idx="2">
+            <a:schemeClr val="dk1"/>
+          </a:lnRef>
+          <a:fillRef idx="1">
+            <a:schemeClr val="lt1"/>
+          </a:fillRef>
+          <a:effectRef idx="0">
+            <a:schemeClr val="dk1"/>
+          </a:effectRef>
+          <a:fontRef idx="minor">
+            <a:schemeClr val="dk1"/>
+          </a:fontRef>
+        </p:style>
+        <p:txBody>
+          <a:bodyPr rtlCol="0" anchor="ctr"/>
+          <a:lstStyle/>
+          <a:p>
+            <a:pPr algn="ctr"/>
+            <a:r>
+              <a:rPr lang="tr-TR" dirty="0"/>
+              <a:t>DC BUS </a:t>
+            </a:r>
+            <a:r>
+              <a:rPr lang="tr-TR" dirty="0" err="1"/>
+              <a:t>Ripple</a:t>
+            </a:r>
+            <a:r>
+              <a:rPr lang="tr-TR" dirty="0"/>
+              <a:t> </a:t>
+            </a:r>
+            <a:r>
+              <a:rPr lang="tr-TR" dirty="0" err="1"/>
+              <a:t>Calculation</a:t>
+            </a:r>
+            <a:endParaRPr lang="en-US" dirty="0"/>
+          </a:p>
+        </p:txBody>
+      </p:sp>
+      <p:sp>
+        <p:nvSpPr>
+          <p:cNvPr id="7" name="Oval 6">
+            <a:extLst>
+              <a:ext uri="{FF2B5EF4-FFF2-40B4-BE49-F238E27FC236}">
+                <a16:creationId xmlns:a16="http://schemas.microsoft.com/office/drawing/2014/main" id="{8F6AB30D-8094-428B-A4D1-BA90F8CFD0F6}"/>
+              </a:ext>
+            </a:extLst>
+          </p:cNvPr>
+          <p:cNvSpPr/>
+          <p:nvPr/>
+        </p:nvSpPr>
+        <p:spPr>
+          <a:xfrm>
+            <a:off x="1691426" y="1414530"/>
+            <a:ext cx="1790163" cy="920839"/>
+          </a:xfrm>
+          <a:prstGeom prst="ellipse">
+            <a:avLst/>
+          </a:prstGeom>
+        </p:spPr>
+        <p:style>
+          <a:lnRef idx="2">
+            <a:schemeClr val="dk1"/>
+          </a:lnRef>
+          <a:fillRef idx="1">
+            <a:schemeClr val="lt1"/>
+          </a:fillRef>
+          <a:effectRef idx="0">
+            <a:schemeClr val="dk1"/>
+          </a:effectRef>
+          <a:fontRef idx="minor">
+            <a:schemeClr val="dk1"/>
+          </a:fontRef>
+        </p:style>
+        <p:txBody>
+          <a:bodyPr rtlCol="0" anchor="ctr"/>
+          <a:lstStyle/>
+          <a:p>
+            <a:pPr algn="ctr"/>
+            <a:r>
+              <a:rPr lang="tr-TR" dirty="0"/>
+              <a:t>RMS</a:t>
+            </a:r>
+            <a:endParaRPr lang="en-US" dirty="0"/>
+          </a:p>
+        </p:txBody>
+      </p:sp>
+      <p:sp>
+        <p:nvSpPr>
+          <p:cNvPr id="8" name="Oval 7">
+            <a:extLst>
+              <a:ext uri="{FF2B5EF4-FFF2-40B4-BE49-F238E27FC236}">
+                <a16:creationId xmlns:a16="http://schemas.microsoft.com/office/drawing/2014/main" id="{F2DFA86C-F992-4898-AB4D-D9C43B7C571D}"/>
+              </a:ext>
+            </a:extLst>
+          </p:cNvPr>
+          <p:cNvSpPr/>
+          <p:nvPr/>
+        </p:nvSpPr>
+        <p:spPr>
+          <a:xfrm>
+            <a:off x="6707747" y="1414530"/>
+            <a:ext cx="1790163" cy="920839"/>
+          </a:xfrm>
+          <a:prstGeom prst="ellipse">
+            <a:avLst/>
+          </a:prstGeom>
+        </p:spPr>
+        <p:style>
+          <a:lnRef idx="2">
+            <a:schemeClr val="dk1"/>
+          </a:lnRef>
+          <a:fillRef idx="1">
+            <a:schemeClr val="lt1"/>
+          </a:fillRef>
+          <a:effectRef idx="0">
+            <a:schemeClr val="dk1"/>
+          </a:effectRef>
+          <a:fontRef idx="minor">
+            <a:schemeClr val="dk1"/>
+          </a:fontRef>
+        </p:style>
+        <p:txBody>
+          <a:bodyPr rtlCol="0" anchor="ctr"/>
+          <a:lstStyle/>
+          <a:p>
+            <a:pPr algn="ctr"/>
+            <a:r>
+              <a:rPr lang="tr-TR" dirty="0" err="1"/>
+              <a:t>Double</a:t>
+            </a:r>
+            <a:r>
+              <a:rPr lang="tr-TR" dirty="0"/>
+              <a:t> </a:t>
+            </a:r>
+            <a:r>
+              <a:rPr lang="tr-TR" dirty="0" err="1"/>
+              <a:t>Fourier</a:t>
+            </a:r>
+            <a:r>
+              <a:rPr lang="tr-TR" dirty="0"/>
+              <a:t> Series</a:t>
+            </a:r>
+            <a:endParaRPr lang="en-US" dirty="0"/>
+          </a:p>
+        </p:txBody>
+      </p:sp>
+      <p:sp>
+        <p:nvSpPr>
+          <p:cNvPr id="9" name="Oval 8">
+            <a:extLst>
+              <a:ext uri="{FF2B5EF4-FFF2-40B4-BE49-F238E27FC236}">
+                <a16:creationId xmlns:a16="http://schemas.microsoft.com/office/drawing/2014/main" id="{3712A8BA-3880-4159-8F15-AF67B36EE0E0}"/>
+              </a:ext>
+            </a:extLst>
+          </p:cNvPr>
+          <p:cNvSpPr/>
+          <p:nvPr/>
+        </p:nvSpPr>
+        <p:spPr>
+          <a:xfrm>
+            <a:off x="7802450" y="2914919"/>
+            <a:ext cx="1790163" cy="920839"/>
+          </a:xfrm>
+          <a:prstGeom prst="ellipse">
+            <a:avLst/>
+          </a:prstGeom>
+        </p:spPr>
+        <p:style>
+          <a:lnRef idx="2">
+            <a:schemeClr val="dk1"/>
+          </a:lnRef>
+          <a:fillRef idx="1">
+            <a:schemeClr val="lt1"/>
+          </a:fillRef>
+          <a:effectRef idx="0">
+            <a:schemeClr val="dk1"/>
+          </a:effectRef>
+          <a:fontRef idx="minor">
+            <a:schemeClr val="dk1"/>
+          </a:fontRef>
+        </p:style>
+        <p:txBody>
+          <a:bodyPr rtlCol="0" anchor="ctr"/>
+          <a:lstStyle/>
+          <a:p>
+            <a:pPr algn="ctr"/>
+            <a:r>
+              <a:rPr lang="tr-TR" dirty="0" err="1"/>
+              <a:t>Ignoring</a:t>
+            </a:r>
+            <a:r>
+              <a:rPr lang="tr-TR" dirty="0"/>
+              <a:t> </a:t>
+            </a:r>
+            <a:r>
+              <a:rPr lang="tr-TR" dirty="0" err="1"/>
+              <a:t>Output</a:t>
+            </a:r>
+            <a:r>
+              <a:rPr lang="tr-TR" dirty="0"/>
+              <a:t> </a:t>
+            </a:r>
+            <a:r>
+              <a:rPr lang="tr-TR" dirty="0" err="1"/>
+              <a:t>ripple</a:t>
+            </a:r>
+            <a:endParaRPr lang="en-US" dirty="0"/>
+          </a:p>
+        </p:txBody>
+      </p:sp>
+      <p:sp>
+        <p:nvSpPr>
+          <p:cNvPr id="10" name="Oval 9">
+            <a:extLst>
+              <a:ext uri="{FF2B5EF4-FFF2-40B4-BE49-F238E27FC236}">
+                <a16:creationId xmlns:a16="http://schemas.microsoft.com/office/drawing/2014/main" id="{77E7E41E-5A70-4CE1-9501-E6A3A6D7DF0E}"/>
+              </a:ext>
+            </a:extLst>
+          </p:cNvPr>
+          <p:cNvSpPr/>
+          <p:nvPr/>
+        </p:nvSpPr>
+        <p:spPr>
+          <a:xfrm>
+            <a:off x="6272011" y="4062212"/>
+            <a:ext cx="1790163" cy="920839"/>
+          </a:xfrm>
+          <a:prstGeom prst="ellipse">
+            <a:avLst/>
+          </a:prstGeom>
+        </p:spPr>
+        <p:style>
+          <a:lnRef idx="2">
+            <a:schemeClr val="dk1"/>
+          </a:lnRef>
+          <a:fillRef idx="1">
+            <a:schemeClr val="lt1"/>
+          </a:fillRef>
+          <a:effectRef idx="0">
+            <a:schemeClr val="dk1"/>
+          </a:effectRef>
+          <a:fontRef idx="minor">
+            <a:schemeClr val="dk1"/>
+          </a:fontRef>
+        </p:style>
+        <p:txBody>
+          <a:bodyPr rtlCol="0" anchor="ctr"/>
+          <a:lstStyle/>
+          <a:p>
+            <a:pPr algn="ctr"/>
+            <a:r>
+              <a:rPr lang="tr-TR" dirty="0" err="1"/>
+              <a:t>Balanced</a:t>
+            </a:r>
+            <a:endParaRPr lang="en-US" dirty="0"/>
+          </a:p>
+        </p:txBody>
+      </p:sp>
+      <p:sp>
+        <p:nvSpPr>
+          <p:cNvPr id="11" name="Oval 10">
+            <a:extLst>
+              <a:ext uri="{FF2B5EF4-FFF2-40B4-BE49-F238E27FC236}">
+                <a16:creationId xmlns:a16="http://schemas.microsoft.com/office/drawing/2014/main" id="{52BA36BD-2F5E-427B-B4F6-A822EEAA9039}"/>
+              </a:ext>
+            </a:extLst>
+          </p:cNvPr>
+          <p:cNvSpPr/>
+          <p:nvPr/>
+        </p:nvSpPr>
+        <p:spPr>
+          <a:xfrm>
+            <a:off x="9659155" y="3950596"/>
+            <a:ext cx="1899632" cy="920839"/>
+          </a:xfrm>
+          <a:prstGeom prst="ellipse">
+            <a:avLst/>
+          </a:prstGeom>
+        </p:spPr>
+        <p:style>
+          <a:lnRef idx="2">
+            <a:schemeClr val="dk1"/>
+          </a:lnRef>
+          <a:fillRef idx="1">
+            <a:schemeClr val="lt1"/>
+          </a:fillRef>
+          <a:effectRef idx="0">
+            <a:schemeClr val="dk1"/>
+          </a:effectRef>
+          <a:fontRef idx="minor">
+            <a:schemeClr val="dk1"/>
+          </a:fontRef>
+        </p:style>
+        <p:txBody>
+          <a:bodyPr rtlCol="0" anchor="ctr"/>
+          <a:lstStyle/>
+          <a:p>
+            <a:pPr algn="ctr"/>
+            <a:r>
+              <a:rPr lang="tr-TR" dirty="0" err="1"/>
+              <a:t>Unbalanced</a:t>
+            </a:r>
+            <a:endParaRPr lang="en-US" dirty="0"/>
+          </a:p>
+        </p:txBody>
+      </p:sp>
+      <p:sp>
+        <p:nvSpPr>
+          <p:cNvPr id="12" name="Oval 11">
+            <a:extLst>
+              <a:ext uri="{FF2B5EF4-FFF2-40B4-BE49-F238E27FC236}">
+                <a16:creationId xmlns:a16="http://schemas.microsoft.com/office/drawing/2014/main" id="{D852578C-FCA3-4193-B15D-127F86C90293}"/>
+              </a:ext>
+            </a:extLst>
+          </p:cNvPr>
+          <p:cNvSpPr/>
+          <p:nvPr/>
+        </p:nvSpPr>
+        <p:spPr>
+          <a:xfrm>
+            <a:off x="9710669" y="5296438"/>
+            <a:ext cx="1790163" cy="920839"/>
+          </a:xfrm>
+          <a:prstGeom prst="ellipse">
+            <a:avLst/>
+          </a:prstGeom>
+        </p:spPr>
+        <p:style>
+          <a:lnRef idx="2">
+            <a:schemeClr val="dk1"/>
+          </a:lnRef>
+          <a:fillRef idx="1">
+            <a:schemeClr val="lt1"/>
+          </a:fillRef>
+          <a:effectRef idx="0">
+            <a:schemeClr val="dk1"/>
+          </a:effectRef>
+          <a:fontRef idx="minor">
+            <a:schemeClr val="dk1"/>
+          </a:fontRef>
+        </p:style>
+        <p:txBody>
+          <a:bodyPr rtlCol="0" anchor="ctr"/>
+          <a:lstStyle/>
+          <a:p>
+            <a:pPr algn="ctr"/>
+            <a:r>
+              <a:rPr lang="tr-TR" sz="1100" dirty="0" err="1"/>
+              <a:t>Positive</a:t>
+            </a:r>
+            <a:r>
+              <a:rPr lang="tr-TR" sz="1100" dirty="0"/>
+              <a:t> </a:t>
+            </a:r>
+            <a:r>
+              <a:rPr lang="tr-TR" sz="1100" dirty="0" err="1"/>
+              <a:t>and</a:t>
+            </a:r>
+            <a:r>
+              <a:rPr lang="tr-TR" sz="1100" dirty="0"/>
+              <a:t> </a:t>
+            </a:r>
+            <a:r>
+              <a:rPr lang="tr-TR" sz="1100" dirty="0" err="1"/>
+              <a:t>Negative</a:t>
+            </a:r>
+            <a:r>
+              <a:rPr lang="tr-TR" sz="1100" dirty="0"/>
+              <a:t> </a:t>
+            </a:r>
+            <a:r>
+              <a:rPr lang="tr-TR" sz="1100" dirty="0" err="1"/>
+              <a:t>Sequence</a:t>
+            </a:r>
+            <a:r>
+              <a:rPr lang="tr-TR" sz="1100" dirty="0"/>
+              <a:t> </a:t>
+            </a:r>
+            <a:r>
+              <a:rPr lang="tr-TR" sz="1100" dirty="0" err="1"/>
+              <a:t>and</a:t>
+            </a:r>
+            <a:r>
+              <a:rPr lang="tr-TR" sz="1100" dirty="0"/>
+              <a:t> </a:t>
+            </a:r>
+            <a:r>
+              <a:rPr lang="tr-TR" sz="1100" dirty="0" err="1"/>
+              <a:t>superposition</a:t>
+            </a:r>
+            <a:endParaRPr lang="en-US" sz="1100" dirty="0"/>
+          </a:p>
+        </p:txBody>
+      </p:sp>
+      <p:sp>
+        <p:nvSpPr>
+          <p:cNvPr id="13" name="Oval 12">
+            <a:extLst>
+              <a:ext uri="{FF2B5EF4-FFF2-40B4-BE49-F238E27FC236}">
+                <a16:creationId xmlns:a16="http://schemas.microsoft.com/office/drawing/2014/main" id="{5BB1CB53-9AC4-4A86-81C3-13D726CC1D55}"/>
+              </a:ext>
+            </a:extLst>
+          </p:cNvPr>
+          <p:cNvSpPr/>
+          <p:nvPr/>
+        </p:nvSpPr>
+        <p:spPr>
+          <a:xfrm>
+            <a:off x="6272010" y="5296438"/>
+            <a:ext cx="1790163" cy="920839"/>
+          </a:xfrm>
+          <a:prstGeom prst="ellipse">
+            <a:avLst/>
+          </a:prstGeom>
+        </p:spPr>
+        <p:style>
+          <a:lnRef idx="2">
+            <a:schemeClr val="dk1"/>
+          </a:lnRef>
+          <a:fillRef idx="1">
+            <a:schemeClr val="lt1"/>
+          </a:fillRef>
+          <a:effectRef idx="0">
+            <a:schemeClr val="dk1"/>
+          </a:effectRef>
+          <a:fontRef idx="minor">
+            <a:schemeClr val="dk1"/>
+          </a:fontRef>
+        </p:style>
+        <p:txBody>
+          <a:bodyPr rtlCol="0" anchor="ctr"/>
+          <a:lstStyle/>
+          <a:p>
+            <a:pPr algn="ctr"/>
+            <a:r>
+              <a:rPr lang="tr-TR" sz="1100" dirty="0" err="1"/>
+              <a:t>Positive</a:t>
+            </a:r>
+            <a:r>
+              <a:rPr lang="tr-TR" sz="1100" dirty="0"/>
+              <a:t> </a:t>
+            </a:r>
+            <a:r>
+              <a:rPr lang="tr-TR" sz="1100" dirty="0" err="1"/>
+              <a:t>Sequence</a:t>
+            </a:r>
+            <a:r>
+              <a:rPr lang="tr-TR" sz="1100" dirty="0"/>
+              <a:t> </a:t>
+            </a:r>
+            <a:r>
+              <a:rPr lang="tr-TR" sz="1100" dirty="0" err="1"/>
+              <a:t>only</a:t>
+            </a:r>
+            <a:r>
+              <a:rPr lang="tr-TR" sz="1100" dirty="0"/>
+              <a:t> </a:t>
+            </a:r>
+            <a:r>
+              <a:rPr lang="tr-TR" sz="1100" dirty="0" err="1"/>
+              <a:t>and</a:t>
+            </a:r>
+            <a:r>
+              <a:rPr lang="tr-TR" sz="1100" dirty="0"/>
+              <a:t> </a:t>
+            </a:r>
+            <a:r>
+              <a:rPr lang="tr-TR" sz="1100" dirty="0" err="1"/>
+              <a:t>superimposed</a:t>
+            </a:r>
+            <a:r>
+              <a:rPr lang="tr-TR" sz="1100" dirty="0"/>
+              <a:t> </a:t>
+            </a:r>
+            <a:r>
+              <a:rPr lang="tr-TR" sz="1100" dirty="0" err="1"/>
+              <a:t>for</a:t>
+            </a:r>
+            <a:r>
+              <a:rPr lang="tr-TR" sz="1100" dirty="0"/>
+              <a:t> </a:t>
+            </a:r>
+            <a:r>
+              <a:rPr lang="tr-TR" sz="1100" dirty="0" err="1"/>
+              <a:t>each</a:t>
+            </a:r>
+            <a:r>
+              <a:rPr lang="tr-TR" sz="1100" dirty="0"/>
+              <a:t> </a:t>
+            </a:r>
+            <a:r>
+              <a:rPr lang="tr-TR" sz="1100" dirty="0" err="1"/>
+              <a:t>phase</a:t>
+            </a:r>
+            <a:endParaRPr lang="en-US" sz="1100" dirty="0"/>
+          </a:p>
+        </p:txBody>
+      </p:sp>
+      <p:cxnSp>
+        <p:nvCxnSpPr>
+          <p:cNvPr id="20" name="Straight Arrow Connector 19">
+            <a:extLst>
+              <a:ext uri="{FF2B5EF4-FFF2-40B4-BE49-F238E27FC236}">
+                <a16:creationId xmlns:a16="http://schemas.microsoft.com/office/drawing/2014/main" id="{20C39977-6F38-4746-8C13-D3F0B990CC5B}"/>
+              </a:ext>
+            </a:extLst>
+          </p:cNvPr>
+          <p:cNvCxnSpPr/>
+          <p:nvPr/>
+        </p:nvCxnSpPr>
+        <p:spPr>
+          <a:xfrm flipH="1">
+            <a:off x="3779949" y="1133341"/>
+            <a:ext cx="882203" cy="547352"/>
+          </a:xfrm>
+          <a:prstGeom prst="straightConnector1">
+            <a:avLst/>
+          </a:prstGeom>
+          <a:ln>
+            <a:tailEnd type="triangle"/>
+          </a:ln>
+        </p:spPr>
+        <p:style>
+          <a:lnRef idx="1">
+            <a:schemeClr val="accent1"/>
+          </a:lnRef>
+          <a:fillRef idx="0">
+            <a:schemeClr val="accent1"/>
+          </a:fillRef>
+          <a:effectRef idx="0">
+            <a:schemeClr val="accent1"/>
+          </a:effectRef>
+          <a:fontRef idx="minor">
+            <a:schemeClr val="tx1"/>
+          </a:fontRef>
+        </p:style>
+      </p:cxnSp>
+      <p:cxnSp>
+        <p:nvCxnSpPr>
+          <p:cNvPr id="22" name="Straight Arrow Connector 21">
+            <a:extLst>
+              <a:ext uri="{FF2B5EF4-FFF2-40B4-BE49-F238E27FC236}">
+                <a16:creationId xmlns:a16="http://schemas.microsoft.com/office/drawing/2014/main" id="{838BCCDB-0388-404C-94D8-F83828B6C7D9}"/>
+              </a:ext>
+            </a:extLst>
+          </p:cNvPr>
+          <p:cNvCxnSpPr/>
+          <p:nvPr/>
+        </p:nvCxnSpPr>
+        <p:spPr>
+          <a:xfrm>
+            <a:off x="6096000" y="1094704"/>
+            <a:ext cx="493689" cy="508716"/>
+          </a:xfrm>
+          <a:prstGeom prst="straightConnector1">
+            <a:avLst/>
+          </a:prstGeom>
+          <a:ln>
+            <a:tailEnd type="triangle"/>
+          </a:ln>
+        </p:spPr>
+        <p:style>
+          <a:lnRef idx="1">
+            <a:schemeClr val="accent1"/>
+          </a:lnRef>
+          <a:fillRef idx="0">
+            <a:schemeClr val="accent1"/>
+          </a:fillRef>
+          <a:effectRef idx="0">
+            <a:schemeClr val="accent1"/>
+          </a:effectRef>
+          <a:fontRef idx="minor">
+            <a:schemeClr val="tx1"/>
+          </a:fontRef>
+        </p:style>
+      </p:cxnSp>
+      <p:cxnSp>
+        <p:nvCxnSpPr>
+          <p:cNvPr id="27" name="Straight Arrow Connector 26">
+            <a:extLst>
+              <a:ext uri="{FF2B5EF4-FFF2-40B4-BE49-F238E27FC236}">
+                <a16:creationId xmlns:a16="http://schemas.microsoft.com/office/drawing/2014/main" id="{13B98A29-12B2-4171-8816-515E1DA27804}"/>
+              </a:ext>
+            </a:extLst>
+          </p:cNvPr>
+          <p:cNvCxnSpPr/>
+          <p:nvPr/>
+        </p:nvCxnSpPr>
+        <p:spPr>
+          <a:xfrm flipH="1">
+            <a:off x="7456867" y="3606085"/>
+            <a:ext cx="296214" cy="229673"/>
+          </a:xfrm>
+          <a:prstGeom prst="straightConnector1">
+            <a:avLst/>
+          </a:prstGeom>
+          <a:ln>
+            <a:tailEnd type="triangle"/>
+          </a:ln>
+        </p:spPr>
+        <p:style>
+          <a:lnRef idx="1">
+            <a:schemeClr val="accent1"/>
+          </a:lnRef>
+          <a:fillRef idx="0">
+            <a:schemeClr val="accent1"/>
+          </a:fillRef>
+          <a:effectRef idx="0">
+            <a:schemeClr val="accent1"/>
+          </a:effectRef>
+          <a:fontRef idx="minor">
+            <a:schemeClr val="tx1"/>
+          </a:fontRef>
+        </p:style>
+      </p:cxnSp>
+      <p:cxnSp>
+        <p:nvCxnSpPr>
+          <p:cNvPr id="29" name="Straight Arrow Connector 28">
+            <a:extLst>
+              <a:ext uri="{FF2B5EF4-FFF2-40B4-BE49-F238E27FC236}">
+                <a16:creationId xmlns:a16="http://schemas.microsoft.com/office/drawing/2014/main" id="{AEF03D56-C3E3-4AB3-BD57-E7ED3FE6CF88}"/>
+              </a:ext>
+            </a:extLst>
+          </p:cNvPr>
+          <p:cNvCxnSpPr/>
+          <p:nvPr/>
+        </p:nvCxnSpPr>
+        <p:spPr>
+          <a:xfrm>
+            <a:off x="9710669" y="3496614"/>
+            <a:ext cx="328412" cy="279043"/>
+          </a:xfrm>
+          <a:prstGeom prst="straightConnector1">
+            <a:avLst/>
+          </a:prstGeom>
+          <a:ln>
+            <a:tailEnd type="triangle"/>
+          </a:ln>
+        </p:spPr>
+        <p:style>
+          <a:lnRef idx="1">
+            <a:schemeClr val="accent1"/>
+          </a:lnRef>
+          <a:fillRef idx="0">
+            <a:schemeClr val="accent1"/>
+          </a:fillRef>
+          <a:effectRef idx="0">
+            <a:schemeClr val="accent1"/>
+          </a:effectRef>
+          <a:fontRef idx="minor">
+            <a:schemeClr val="tx1"/>
+          </a:fontRef>
+        </p:style>
+      </p:cxnSp>
+      <p:cxnSp>
+        <p:nvCxnSpPr>
+          <p:cNvPr id="31" name="Straight Arrow Connector 30">
+            <a:extLst>
+              <a:ext uri="{FF2B5EF4-FFF2-40B4-BE49-F238E27FC236}">
+                <a16:creationId xmlns:a16="http://schemas.microsoft.com/office/drawing/2014/main" id="{D1B1F406-B2D7-48A5-8344-195EE8E9126F}"/>
+              </a:ext>
+            </a:extLst>
+          </p:cNvPr>
+          <p:cNvCxnSpPr/>
+          <p:nvPr/>
+        </p:nvCxnSpPr>
+        <p:spPr>
+          <a:xfrm>
+            <a:off x="7287295" y="5030274"/>
+            <a:ext cx="0" cy="195330"/>
+          </a:xfrm>
+          <a:prstGeom prst="straightConnector1">
+            <a:avLst/>
+          </a:prstGeom>
+          <a:ln>
+            <a:tailEnd type="triangle"/>
+          </a:ln>
+        </p:spPr>
+        <p:style>
+          <a:lnRef idx="1">
+            <a:schemeClr val="accent1"/>
+          </a:lnRef>
+          <a:fillRef idx="0">
+            <a:schemeClr val="accent1"/>
+          </a:fillRef>
+          <a:effectRef idx="0">
+            <a:schemeClr val="accent1"/>
+          </a:effectRef>
+          <a:fontRef idx="minor">
+            <a:schemeClr val="tx1"/>
+          </a:fontRef>
+        </p:style>
+      </p:cxnSp>
+      <p:cxnSp>
+        <p:nvCxnSpPr>
+          <p:cNvPr id="33" name="Straight Arrow Connector 32">
+            <a:extLst>
+              <a:ext uri="{FF2B5EF4-FFF2-40B4-BE49-F238E27FC236}">
+                <a16:creationId xmlns:a16="http://schemas.microsoft.com/office/drawing/2014/main" id="{2EFF0F8C-89BC-43EC-9FBA-EBD375FC967D}"/>
+              </a:ext>
+            </a:extLst>
+          </p:cNvPr>
+          <p:cNvCxnSpPr/>
+          <p:nvPr/>
+        </p:nvCxnSpPr>
+        <p:spPr>
+          <a:xfrm>
+            <a:off x="10592873" y="4939048"/>
+            <a:ext cx="0" cy="182451"/>
+          </a:xfrm>
+          <a:prstGeom prst="straightConnector1">
+            <a:avLst/>
+          </a:prstGeom>
+          <a:ln>
+            <a:tailEnd type="triangle"/>
+          </a:ln>
+        </p:spPr>
+        <p:style>
+          <a:lnRef idx="1">
+            <a:schemeClr val="accent1"/>
+          </a:lnRef>
+          <a:fillRef idx="0">
+            <a:schemeClr val="accent1"/>
+          </a:fillRef>
+          <a:effectRef idx="0">
+            <a:schemeClr val="accent1"/>
+          </a:effectRef>
+          <a:fontRef idx="minor">
+            <a:schemeClr val="tx1"/>
+          </a:fontRef>
+        </p:style>
+      </p:cxnSp>
+      <p:sp>
+        <p:nvSpPr>
+          <p:cNvPr id="34" name="TextBox 33">
+            <a:extLst>
+              <a:ext uri="{FF2B5EF4-FFF2-40B4-BE49-F238E27FC236}">
+                <a16:creationId xmlns:a16="http://schemas.microsoft.com/office/drawing/2014/main" id="{085083C2-71F9-4852-9EFE-17ADEA5EEF42}"/>
+              </a:ext>
+            </a:extLst>
+          </p:cNvPr>
+          <p:cNvSpPr txBox="1"/>
+          <p:nvPr/>
+        </p:nvSpPr>
+        <p:spPr>
+          <a:xfrm>
+            <a:off x="8615965" y="1414530"/>
+            <a:ext cx="2292441" cy="923330"/>
+          </a:xfrm>
+          <a:prstGeom prst="rect">
+            <a:avLst/>
+          </a:prstGeom>
+          <a:noFill/>
+        </p:spPr>
+        <p:txBody>
+          <a:bodyPr wrap="square" rtlCol="0">
+            <a:spAutoFit/>
+          </a:bodyPr>
+          <a:lstStyle/>
+          <a:p>
+            <a:r>
+              <a:rPr lang="tr-TR" dirty="0" err="1">
+                <a:solidFill>
+                  <a:srgbClr val="FF0000"/>
+                </a:solidFill>
+              </a:rPr>
+              <a:t>Actually</a:t>
+            </a:r>
+            <a:r>
+              <a:rPr lang="tr-TR" dirty="0">
+                <a:solidFill>
+                  <a:srgbClr val="FF0000"/>
+                </a:solidFill>
+              </a:rPr>
+              <a:t>, it is </a:t>
+            </a:r>
+            <a:r>
+              <a:rPr lang="tr-TR" dirty="0" err="1">
+                <a:solidFill>
+                  <a:srgbClr val="FF0000"/>
+                </a:solidFill>
+              </a:rPr>
+              <a:t>switching</a:t>
+            </a:r>
+            <a:r>
+              <a:rPr lang="tr-TR" dirty="0">
+                <a:solidFill>
+                  <a:srgbClr val="FF0000"/>
+                </a:solidFill>
+              </a:rPr>
+              <a:t> </a:t>
+            </a:r>
+            <a:r>
+              <a:rPr lang="tr-TR" dirty="0" err="1">
+                <a:solidFill>
+                  <a:srgbClr val="FF0000"/>
+                </a:solidFill>
+              </a:rPr>
+              <a:t>function</a:t>
+            </a:r>
+            <a:endParaRPr lang="tr-TR" dirty="0">
+              <a:solidFill>
+                <a:srgbClr val="FF0000"/>
+              </a:solidFill>
+            </a:endParaRPr>
+          </a:p>
+          <a:p>
+            <a:endParaRPr lang="en-US" dirty="0"/>
+          </a:p>
+        </p:txBody>
+      </p:sp>
+      <p:sp>
+        <p:nvSpPr>
+          <p:cNvPr id="35" name="Oval 34">
+            <a:extLst>
+              <a:ext uri="{FF2B5EF4-FFF2-40B4-BE49-F238E27FC236}">
+                <a16:creationId xmlns:a16="http://schemas.microsoft.com/office/drawing/2014/main" id="{AB773508-9996-43BE-88DE-658EDE8AC169}"/>
+              </a:ext>
+            </a:extLst>
+          </p:cNvPr>
+          <p:cNvSpPr/>
+          <p:nvPr/>
+        </p:nvSpPr>
+        <p:spPr>
+          <a:xfrm>
+            <a:off x="4389552" y="2800082"/>
+            <a:ext cx="1882460" cy="920839"/>
+          </a:xfrm>
+          <a:prstGeom prst="ellipse">
+            <a:avLst/>
+          </a:prstGeom>
+        </p:spPr>
+        <p:style>
+          <a:lnRef idx="2">
+            <a:schemeClr val="dk1"/>
+          </a:lnRef>
+          <a:fillRef idx="1">
+            <a:schemeClr val="lt1"/>
+          </a:fillRef>
+          <a:effectRef idx="0">
+            <a:schemeClr val="dk1"/>
+          </a:effectRef>
+          <a:fontRef idx="minor">
+            <a:schemeClr val="dk1"/>
+          </a:fontRef>
+        </p:style>
+        <p:txBody>
+          <a:bodyPr rtlCol="0" anchor="ctr"/>
+          <a:lstStyle/>
+          <a:p>
+            <a:pPr algn="ctr"/>
+            <a:r>
+              <a:rPr lang="tr-TR" dirty="0" err="1"/>
+              <a:t>Considering</a:t>
+            </a:r>
+            <a:r>
+              <a:rPr lang="tr-TR" dirty="0"/>
+              <a:t> </a:t>
+            </a:r>
+            <a:r>
+              <a:rPr lang="tr-TR" dirty="0" err="1"/>
+              <a:t>Output</a:t>
+            </a:r>
+            <a:r>
+              <a:rPr lang="tr-TR" dirty="0"/>
+              <a:t> </a:t>
+            </a:r>
+            <a:r>
+              <a:rPr lang="tr-TR" dirty="0" err="1"/>
+              <a:t>Ripple</a:t>
+            </a:r>
+            <a:endParaRPr lang="en-US" dirty="0"/>
+          </a:p>
+        </p:txBody>
+      </p:sp>
+      <p:cxnSp>
+        <p:nvCxnSpPr>
+          <p:cNvPr id="37" name="Straight Arrow Connector 36">
+            <a:extLst>
+              <a:ext uri="{FF2B5EF4-FFF2-40B4-BE49-F238E27FC236}">
+                <a16:creationId xmlns:a16="http://schemas.microsoft.com/office/drawing/2014/main" id="{AA109B15-CAC4-46E4-913E-531ACB4672F5}"/>
+              </a:ext>
+            </a:extLst>
+          </p:cNvPr>
+          <p:cNvCxnSpPr/>
+          <p:nvPr/>
+        </p:nvCxnSpPr>
+        <p:spPr>
+          <a:xfrm>
+            <a:off x="7991341" y="2472744"/>
+            <a:ext cx="238259" cy="373487"/>
+          </a:xfrm>
+          <a:prstGeom prst="straightConnector1">
+            <a:avLst/>
+          </a:prstGeom>
+          <a:ln>
+            <a:tailEnd type="triangle"/>
+          </a:ln>
+        </p:spPr>
+        <p:style>
+          <a:lnRef idx="1">
+            <a:schemeClr val="accent1"/>
+          </a:lnRef>
+          <a:fillRef idx="0">
+            <a:schemeClr val="accent1"/>
+          </a:fillRef>
+          <a:effectRef idx="0">
+            <a:schemeClr val="accent1"/>
+          </a:effectRef>
+          <a:fontRef idx="minor">
+            <a:schemeClr val="tx1"/>
+          </a:fontRef>
+        </p:style>
+      </p:cxnSp>
+      <p:cxnSp>
+        <p:nvCxnSpPr>
+          <p:cNvPr id="39" name="Straight Arrow Connector 38">
+            <a:extLst>
+              <a:ext uri="{FF2B5EF4-FFF2-40B4-BE49-F238E27FC236}">
+                <a16:creationId xmlns:a16="http://schemas.microsoft.com/office/drawing/2014/main" id="{B7A1FD12-2EC7-46F7-8D9E-2ACF572132A7}"/>
+              </a:ext>
+            </a:extLst>
+          </p:cNvPr>
+          <p:cNvCxnSpPr/>
+          <p:nvPr/>
+        </p:nvCxnSpPr>
+        <p:spPr>
+          <a:xfrm flipH="1">
+            <a:off x="6181859" y="2260242"/>
+            <a:ext cx="643944" cy="539840"/>
+          </a:xfrm>
+          <a:prstGeom prst="straightConnector1">
+            <a:avLst/>
+          </a:prstGeom>
+          <a:ln>
+            <a:tailEnd type="triangle"/>
+          </a:ln>
+        </p:spPr>
+        <p:style>
+          <a:lnRef idx="1">
+            <a:schemeClr val="accent1"/>
+          </a:lnRef>
+          <a:fillRef idx="0">
+            <a:schemeClr val="accent1"/>
+          </a:fillRef>
+          <a:effectRef idx="0">
+            <a:schemeClr val="accent1"/>
+          </a:effectRef>
+          <a:fontRef idx="minor">
+            <a:schemeClr val="tx1"/>
+          </a:fontRef>
+        </p:style>
+      </p:cxnSp>
+      <p:sp>
+        <p:nvSpPr>
+          <p:cNvPr id="40" name="TextBox 39">
+            <a:extLst>
+              <a:ext uri="{FF2B5EF4-FFF2-40B4-BE49-F238E27FC236}">
+                <a16:creationId xmlns:a16="http://schemas.microsoft.com/office/drawing/2014/main" id="{6C059F2D-B399-4DBC-865B-31BCE82FB2C3}"/>
+              </a:ext>
+            </a:extLst>
+          </p:cNvPr>
+          <p:cNvSpPr txBox="1"/>
+          <p:nvPr/>
+        </p:nvSpPr>
+        <p:spPr>
+          <a:xfrm>
+            <a:off x="9659155" y="2711003"/>
+            <a:ext cx="1652787" cy="923330"/>
+          </a:xfrm>
+          <a:prstGeom prst="rect">
+            <a:avLst/>
+          </a:prstGeom>
+          <a:noFill/>
+        </p:spPr>
+        <p:txBody>
+          <a:bodyPr wrap="square" rtlCol="0">
+            <a:spAutoFit/>
+          </a:bodyPr>
+          <a:lstStyle/>
+          <a:p>
+            <a:r>
+              <a:rPr lang="tr-TR" dirty="0" err="1">
+                <a:solidFill>
+                  <a:srgbClr val="FF0000"/>
+                </a:solidFill>
+              </a:rPr>
+              <a:t>It</a:t>
+            </a:r>
+            <a:r>
+              <a:rPr lang="tr-TR" dirty="0">
+                <a:solidFill>
+                  <a:srgbClr val="FF0000"/>
+                </a:solidFill>
+              </a:rPr>
+              <a:t> can be </a:t>
+            </a:r>
+            <a:r>
+              <a:rPr lang="tr-TR" dirty="0" err="1">
+                <a:solidFill>
+                  <a:srgbClr val="FF0000"/>
+                </a:solidFill>
+              </a:rPr>
+              <a:t>bringed</a:t>
+            </a:r>
+            <a:r>
+              <a:rPr lang="tr-TR" dirty="0">
+                <a:solidFill>
+                  <a:srgbClr val="FF0000"/>
+                </a:solidFill>
+              </a:rPr>
+              <a:t> </a:t>
+            </a:r>
+            <a:r>
+              <a:rPr lang="tr-TR" dirty="0" err="1">
+                <a:solidFill>
+                  <a:srgbClr val="FF0000"/>
+                </a:solidFill>
+              </a:rPr>
+              <a:t>closed</a:t>
+            </a:r>
+            <a:r>
+              <a:rPr lang="tr-TR" dirty="0">
+                <a:solidFill>
+                  <a:srgbClr val="FF0000"/>
+                </a:solidFill>
+              </a:rPr>
+              <a:t> form</a:t>
+            </a:r>
+            <a:endParaRPr lang="en-US" dirty="0">
+              <a:solidFill>
+                <a:srgbClr val="FF0000"/>
+              </a:solidFill>
+            </a:endParaRPr>
+          </a:p>
+        </p:txBody>
+      </p:sp>
+      <mc:AlternateContent xmlns:mc="http://schemas.openxmlformats.org/markup-compatibility/2006">
+        <mc:Choice xmlns:a14="http://schemas.microsoft.com/office/drawing/2010/main" Requires="a14">
+          <p:sp>
+            <p:nvSpPr>
+              <p:cNvPr id="41" name="TextBox 40">
+                <a:extLst>
+                  <a:ext uri="{FF2B5EF4-FFF2-40B4-BE49-F238E27FC236}">
+                    <a16:creationId xmlns:a16="http://schemas.microsoft.com/office/drawing/2014/main" id="{BC60BD1B-7A51-4B50-89B2-D7F7082B2B25}"/>
+                  </a:ext>
+                </a:extLst>
+              </p:cNvPr>
+              <p:cNvSpPr txBox="1"/>
+              <p:nvPr/>
+            </p:nvSpPr>
+            <p:spPr>
+              <a:xfrm>
+                <a:off x="4221050" y="6350012"/>
+                <a:ext cx="5748269" cy="391582"/>
+              </a:xfrm>
+              <a:prstGeom prst="rect">
+                <a:avLst/>
+              </a:prstGeom>
+              <a:noFill/>
+            </p:spPr>
+            <p:txBody>
+              <a:bodyPr wrap="square" rtlCol="0">
+                <a:spAutoFit/>
+              </a:bodyPr>
+              <a:lstStyle/>
+              <a:p>
+                <a14:m>
+                  <m:oMathPara xmlns:m="http://schemas.openxmlformats.org/officeDocument/2006/math">
+                    <m:oMathParaPr>
+                      <m:jc m:val="centerGroup"/>
+                    </m:oMathParaPr>
+                    <m:oMath xmlns:m="http://schemas.openxmlformats.org/officeDocument/2006/math">
+                      <m:sSub>
+                        <m:sSubPr>
+                          <m:ctrlPr>
+                            <a:rPr lang="tr-TR" b="0" i="1" smtClean="0">
+                              <a:latin typeface="Cambria Math" panose="02040503050406030204" pitchFamily="18" charset="0"/>
+                            </a:rPr>
+                          </m:ctrlPr>
+                        </m:sSubPr>
+                        <m:e>
+                          <m:r>
+                            <a:rPr lang="tr-TR" b="0" i="1" smtClean="0">
+                              <a:latin typeface="Cambria Math" panose="02040503050406030204" pitchFamily="18" charset="0"/>
+                            </a:rPr>
+                            <m:t>𝑉</m:t>
+                          </m:r>
+                        </m:e>
+                        <m:sub>
+                          <m:r>
+                            <a:rPr lang="tr-TR" b="0" i="1" smtClean="0">
+                              <a:latin typeface="Cambria Math" panose="02040503050406030204" pitchFamily="18" charset="0"/>
+                            </a:rPr>
+                            <m:t>𝑑𝑐</m:t>
+                          </m:r>
+                        </m:sub>
+                      </m:sSub>
+                      <m:r>
+                        <a:rPr lang="tr-TR" b="0" i="1" smtClean="0">
+                          <a:latin typeface="Cambria Math" panose="02040503050406030204" pitchFamily="18" charset="0"/>
+                        </a:rPr>
+                        <m:t>+</m:t>
+                      </m:r>
+                      <m:sSub>
+                        <m:sSubPr>
+                          <m:ctrlPr>
+                            <a:rPr lang="tr-TR" b="0" i="1" smtClean="0">
+                              <a:latin typeface="Cambria Math" panose="02040503050406030204" pitchFamily="18" charset="0"/>
+                            </a:rPr>
+                          </m:ctrlPr>
+                        </m:sSubPr>
+                        <m:e>
+                          <m:r>
+                            <a:rPr lang="tr-TR" b="0" i="1" smtClean="0">
+                              <a:latin typeface="Cambria Math" panose="02040503050406030204" pitchFamily="18" charset="0"/>
+                            </a:rPr>
+                            <m:t>𝑉</m:t>
+                          </m:r>
+                        </m:e>
+                        <m:sub>
+                          <m:r>
+                            <a:rPr lang="tr-TR" b="0" i="1" smtClean="0">
+                              <a:latin typeface="Cambria Math" panose="02040503050406030204" pitchFamily="18" charset="0"/>
+                            </a:rPr>
+                            <m:t>h𝑓</m:t>
+                          </m:r>
+                        </m:sub>
+                      </m:sSub>
+                    </m:oMath>
+                  </m:oMathPara>
+                </a14:m>
+                <a:endParaRPr lang="en-US" dirty="0"/>
+              </a:p>
+            </p:txBody>
+          </p:sp>
+        </mc:Choice>
+        <mc:Fallback>
+          <p:sp>
+            <p:nvSpPr>
+              <p:cNvPr id="41" name="TextBox 40">
+                <a:extLst>
+                  <a:ext uri="{FF2B5EF4-FFF2-40B4-BE49-F238E27FC236}">
+                    <a16:creationId xmlns:a16="http://schemas.microsoft.com/office/drawing/2014/main" id="{BC60BD1B-7A51-4B50-89B2-D7F7082B2B25}"/>
+                  </a:ext>
+                </a:extLst>
+              </p:cNvPr>
+              <p:cNvSpPr txBox="1">
+                <a:spLocks noRot="1" noChangeAspect="1" noMove="1" noResize="1" noEditPoints="1" noAdjustHandles="1" noChangeArrowheads="1" noChangeShapeType="1" noTextEdit="1"/>
+              </p:cNvSpPr>
+              <p:nvPr/>
+            </p:nvSpPr>
+            <p:spPr>
+              <a:xfrm>
+                <a:off x="4221050" y="6350012"/>
+                <a:ext cx="5748269" cy="391582"/>
+              </a:xfrm>
+              <a:prstGeom prst="rect">
+                <a:avLst/>
+              </a:prstGeom>
+              <a:blipFill>
+                <a:blip r:embed="rId2"/>
+                <a:stretch>
+                  <a:fillRect b="-9375"/>
+                </a:stretch>
+              </a:blipFill>
+            </p:spPr>
+            <p:txBody>
+              <a:bodyPr/>
+              <a:lstStyle/>
+              <a:p>
+                <a:r>
+                  <a:rPr lang="en-US">
+                    <a:noFill/>
+                  </a:rPr>
+                  <a:t> </a:t>
+                </a:r>
+              </a:p>
+            </p:txBody>
+          </p:sp>
+        </mc:Fallback>
+      </mc:AlternateContent>
+      <mc:AlternateContent xmlns:mc="http://schemas.openxmlformats.org/markup-compatibility/2006">
+        <mc:Choice xmlns:a14="http://schemas.microsoft.com/office/drawing/2010/main" Requires="a14">
+          <p:sp>
+            <p:nvSpPr>
+              <p:cNvPr id="42" name="TextBox 41">
+                <a:extLst>
+                  <a:ext uri="{FF2B5EF4-FFF2-40B4-BE49-F238E27FC236}">
+                    <a16:creationId xmlns:a16="http://schemas.microsoft.com/office/drawing/2014/main" id="{64154444-9FDE-4B8B-B9FF-25373F81DF19}"/>
+                  </a:ext>
+                </a:extLst>
+              </p:cNvPr>
+              <p:cNvSpPr txBox="1"/>
+              <p:nvPr/>
+            </p:nvSpPr>
+            <p:spPr>
+              <a:xfrm>
+                <a:off x="7456867" y="6273812"/>
+                <a:ext cx="5748269" cy="391582"/>
+              </a:xfrm>
+              <a:prstGeom prst="rect">
+                <a:avLst/>
+              </a:prstGeom>
+              <a:noFill/>
+            </p:spPr>
+            <p:txBody>
+              <a:bodyPr wrap="square" rtlCol="0">
+                <a:spAutoFit/>
+              </a:bodyPr>
+              <a:lstStyle/>
+              <a:p>
+                <a14:m>
+                  <m:oMathPara xmlns:m="http://schemas.openxmlformats.org/officeDocument/2006/math">
+                    <m:oMathParaPr>
+                      <m:jc m:val="centerGroup"/>
+                    </m:oMathParaPr>
+                    <m:oMath xmlns:m="http://schemas.openxmlformats.org/officeDocument/2006/math">
+                      <m:sSub>
+                        <m:sSubPr>
+                          <m:ctrlPr>
+                            <a:rPr lang="tr-TR" b="0" i="1" smtClean="0">
+                              <a:latin typeface="Cambria Math" panose="02040503050406030204" pitchFamily="18" charset="0"/>
+                            </a:rPr>
+                          </m:ctrlPr>
+                        </m:sSubPr>
+                        <m:e>
+                          <m:r>
+                            <a:rPr lang="tr-TR" b="0" i="1" smtClean="0">
+                              <a:latin typeface="Cambria Math" panose="02040503050406030204" pitchFamily="18" charset="0"/>
+                            </a:rPr>
+                            <m:t>𝑉</m:t>
+                          </m:r>
+                        </m:e>
+                        <m:sub>
+                          <m:r>
+                            <a:rPr lang="tr-TR" b="0" i="1" smtClean="0">
+                              <a:latin typeface="Cambria Math" panose="02040503050406030204" pitchFamily="18" charset="0"/>
+                            </a:rPr>
+                            <m:t>𝑑𝑐</m:t>
+                          </m:r>
+                        </m:sub>
+                      </m:sSub>
+                      <m:r>
+                        <a:rPr lang="tr-TR" b="0" i="1" smtClean="0">
+                          <a:latin typeface="Cambria Math" panose="02040503050406030204" pitchFamily="18" charset="0"/>
+                        </a:rPr>
+                        <m:t>+</m:t>
+                      </m:r>
+                      <m:sSub>
+                        <m:sSubPr>
+                          <m:ctrlPr>
+                            <a:rPr lang="tr-TR" b="0" i="1" smtClean="0">
+                              <a:latin typeface="Cambria Math" panose="02040503050406030204" pitchFamily="18" charset="0"/>
+                            </a:rPr>
+                          </m:ctrlPr>
+                        </m:sSubPr>
+                        <m:e>
+                          <m:r>
+                            <a:rPr lang="tr-TR" b="0" i="1" smtClean="0">
+                              <a:latin typeface="Cambria Math" panose="02040503050406030204" pitchFamily="18" charset="0"/>
+                            </a:rPr>
+                            <m:t>𝑉</m:t>
+                          </m:r>
+                        </m:e>
+                        <m:sub>
+                          <m:r>
+                            <a:rPr lang="tr-TR" b="0" i="1" smtClean="0">
+                              <a:latin typeface="Cambria Math" panose="02040503050406030204" pitchFamily="18" charset="0"/>
+                            </a:rPr>
+                            <m:t>h𝑓</m:t>
+                          </m:r>
+                        </m:sub>
+                      </m:sSub>
+                      <m:r>
+                        <a:rPr lang="tr-TR" b="0" i="1" smtClean="0">
+                          <a:latin typeface="Cambria Math" panose="02040503050406030204" pitchFamily="18" charset="0"/>
+                        </a:rPr>
+                        <m:t>+</m:t>
+                      </m:r>
+                      <m:sSub>
+                        <m:sSubPr>
+                          <m:ctrlPr>
+                            <a:rPr lang="tr-TR" b="0" i="1" smtClean="0">
+                              <a:latin typeface="Cambria Math" panose="02040503050406030204" pitchFamily="18" charset="0"/>
+                            </a:rPr>
+                          </m:ctrlPr>
+                        </m:sSubPr>
+                        <m:e>
+                          <m:r>
+                            <a:rPr lang="tr-TR" b="0" i="1" smtClean="0">
+                              <a:latin typeface="Cambria Math" panose="02040503050406030204" pitchFamily="18" charset="0"/>
+                            </a:rPr>
+                            <m:t>𝑉</m:t>
+                          </m:r>
+                        </m:e>
+                        <m:sub>
+                          <m:r>
+                            <a:rPr lang="tr-TR" b="0" i="1" smtClean="0">
+                              <a:latin typeface="Cambria Math" panose="02040503050406030204" pitchFamily="18" charset="0"/>
+                            </a:rPr>
+                            <m:t>𝑙𝑓</m:t>
+                          </m:r>
+                        </m:sub>
+                      </m:sSub>
+                    </m:oMath>
+                  </m:oMathPara>
+                </a14:m>
+                <a:endParaRPr lang="en-US" dirty="0"/>
+              </a:p>
+            </p:txBody>
+          </p:sp>
+        </mc:Choice>
+        <mc:Fallback>
+          <p:sp>
+            <p:nvSpPr>
+              <p:cNvPr id="42" name="TextBox 41">
+                <a:extLst>
+                  <a:ext uri="{FF2B5EF4-FFF2-40B4-BE49-F238E27FC236}">
+                    <a16:creationId xmlns:a16="http://schemas.microsoft.com/office/drawing/2014/main" id="{64154444-9FDE-4B8B-B9FF-25373F81DF19}"/>
+                  </a:ext>
+                </a:extLst>
+              </p:cNvPr>
+              <p:cNvSpPr txBox="1">
+                <a:spLocks noRot="1" noChangeAspect="1" noMove="1" noResize="1" noEditPoints="1" noAdjustHandles="1" noChangeArrowheads="1" noChangeShapeType="1" noTextEdit="1"/>
+              </p:cNvSpPr>
+              <p:nvPr/>
+            </p:nvSpPr>
+            <p:spPr>
+              <a:xfrm>
+                <a:off x="7456867" y="6273812"/>
+                <a:ext cx="5748269" cy="391582"/>
+              </a:xfrm>
+              <a:prstGeom prst="rect">
+                <a:avLst/>
+              </a:prstGeom>
+              <a:blipFill>
+                <a:blip r:embed="rId3"/>
+                <a:stretch>
+                  <a:fillRect b="-10938"/>
+                </a:stretch>
+              </a:blipFill>
+            </p:spPr>
+            <p:txBody>
+              <a:bodyPr/>
+              <a:lstStyle/>
+              <a:p>
+                <a:r>
+                  <a:rPr lang="en-US">
+                    <a:noFill/>
+                  </a:rPr>
+                  <a:t> </a:t>
+                </a:r>
+              </a:p>
+            </p:txBody>
+          </p:sp>
+        </mc:Fallback>
+      </mc:AlternateContent>
+    </p:spTree>
+    <p:extLst>
+      <p:ext uri="{BB962C8B-B14F-4D97-AF65-F5344CB8AC3E}">
+        <p14:creationId xmlns:p14="http://schemas.microsoft.com/office/powerpoint/2010/main" val="3117507474"/>
+      </p:ext>
+    </p:extLst>
+  </p:cSld>
+  <p:clrMapOvr>
+    <a:masterClrMapping/>
+  </p:clrMapOvr>
+</p:sld>
+</file>
+
+<file path=ppt/slides/slide22.xml><?xml version="1.0" encoding="utf-8"?>
+<p:sld xmlns:a="http://schemas.openxmlformats.org/drawingml/2006/main" xmlns:r="http://schemas.openxmlformats.org/officeDocument/2006/relationships" xmlns:p="http://schemas.openxmlformats.org/presentationml/2006/main">
+  <p:cSld>
+    <p:spTree>
+      <p:nvGrpSpPr>
+        <p:cNvPr id="1" name=""/>
+        <p:cNvGrpSpPr/>
+        <p:nvPr/>
+      </p:nvGrpSpPr>
+      <p:grpSpPr>
+        <a:xfrm>
+          <a:off x="0" y="0"/>
+          <a:ext cx="0" cy="0"/>
+          <a:chOff x="0" y="0"/>
+          <a:chExt cx="0" cy="0"/>
+        </a:xfrm>
+      </p:grpSpPr>
+      <p:sp>
+        <p:nvSpPr>
+          <p:cNvPr id="2" name="Title 1">
+            <a:extLst>
+              <a:ext uri="{FF2B5EF4-FFF2-40B4-BE49-F238E27FC236}">
+                <a16:creationId xmlns:a16="http://schemas.microsoft.com/office/drawing/2014/main" id="{6D831599-8BC3-4060-8F6E-44A834A9E896}"/>
+              </a:ext>
+            </a:extLst>
+          </p:cNvPr>
+          <p:cNvSpPr>
+            <a:spLocks noGrp="1"/>
+          </p:cNvSpPr>
+          <p:nvPr>
+            <p:ph type="title"/>
+          </p:nvPr>
+        </p:nvSpPr>
+        <p:spPr/>
+        <p:txBody>
+          <a:bodyPr>
+            <a:normAutofit fontScale="90000"/>
+          </a:bodyPr>
+          <a:lstStyle/>
+          <a:p>
+            <a:r>
+              <a:rPr lang="en-US" dirty="0">
+                <a:hlinkClick r:id="rId2"/>
+              </a:rPr>
+              <a:t>Analytical calculation of the RMS current stress on the DC-link capacitor of voltage-PWM converter systems</a:t>
+            </a:r>
+            <a:r>
+              <a:rPr lang="tr-TR" dirty="0">
+                <a:hlinkClick r:id="rId2"/>
+              </a:rPr>
+              <a:t>  </a:t>
+            </a:r>
+            <a:r>
+              <a:rPr lang="tr-TR" dirty="0"/>
+              <a:t>(Kolar)</a:t>
+            </a:r>
+            <a:endParaRPr lang="en-US" dirty="0"/>
+          </a:p>
+        </p:txBody>
+      </p:sp>
+      <p:pic>
+        <p:nvPicPr>
+          <p:cNvPr id="4" name="Content Placeholder 3">
+            <a:extLst>
+              <a:ext uri="{FF2B5EF4-FFF2-40B4-BE49-F238E27FC236}">
+                <a16:creationId xmlns:a16="http://schemas.microsoft.com/office/drawing/2014/main" id="{58EEEAC6-4308-4C66-8C4A-BA44015478E2}"/>
+              </a:ext>
+            </a:extLst>
+          </p:cNvPr>
+          <p:cNvPicPr>
+            <a:picLocks noGrp="1" noChangeAspect="1"/>
+          </p:cNvPicPr>
+          <p:nvPr>
+            <p:ph idx="1"/>
+          </p:nvPr>
+        </p:nvPicPr>
+        <p:blipFill>
+          <a:blip r:embed="rId3"/>
+          <a:stretch>
+            <a:fillRect/>
+          </a:stretch>
+        </p:blipFill>
+        <p:spPr>
+          <a:xfrm>
+            <a:off x="750195" y="2138317"/>
+            <a:ext cx="5694608" cy="4351338"/>
+          </a:xfrm>
+          <a:prstGeom prst="rect">
+            <a:avLst/>
+          </a:prstGeom>
+        </p:spPr>
+      </p:pic>
+    </p:spTree>
+    <p:extLst>
+      <p:ext uri="{BB962C8B-B14F-4D97-AF65-F5344CB8AC3E}">
+        <p14:creationId xmlns:p14="http://schemas.microsoft.com/office/powerpoint/2010/main" val="2539676698"/>
       </p:ext>
     </p:extLst>
   </p:cSld>
@@ -6734,21 +8875,44 @@
                 <a:effectLst/>
                 <a:latin typeface="Times New Roman" panose="02020603050405020304" pitchFamily="18" charset="0"/>
               </a:rPr>
-              <a:t>However, the frequency spectrum of the output load current contains both an output fundamental and harmonic ripple components. If the harmonic ripple compo-</a:t>
-            </a:r>
-            <a:r>
-              <a:rPr lang="en-US" b="0" i="0" dirty="0" err="1">
+              <a:t>However, the frequency spectrum of the output load current contains both an output fundamental and harmonic ripple components. </a:t>
+            </a:r>
+            <a:r>
+              <a:rPr lang="en-US" b="0" i="0" dirty="0">
+                <a:solidFill>
+                  <a:srgbClr val="FF0000"/>
+                </a:solidFill>
                 <a:effectLst/>
                 <a:latin typeface="Times New Roman" panose="02020603050405020304" pitchFamily="18" charset="0"/>
               </a:rPr>
+              <a:t>If the harmonic ripple compo-</a:t>
+            </a:r>
+            <a:r>
+              <a:rPr lang="en-US" b="0" i="0" dirty="0" err="1">
+                <a:solidFill>
+                  <a:srgbClr val="FF0000"/>
+                </a:solidFill>
+                <a:effectLst/>
+                <a:latin typeface="Times New Roman" panose="02020603050405020304" pitchFamily="18" charset="0"/>
+              </a:rPr>
               <a:t>nents</a:t>
+            </a:r>
+            <a:r>
+              <a:rPr lang="en-US" b="0" i="0" dirty="0">
+                <a:solidFill>
+                  <a:srgbClr val="FF0000"/>
+                </a:solidFill>
+                <a:effectLst/>
+                <a:latin typeface="Times New Roman" panose="02020603050405020304" pitchFamily="18" charset="0"/>
+              </a:rPr>
+              <a:t> are neglected, the convolution operation is significantly </a:t>
             </a:r>
             <a:r>
               <a:rPr lang="en-US" b="0" i="0" dirty="0">
                 <a:effectLst/>
                 <a:latin typeface="Times New Roman" panose="02020603050405020304" pitchFamily="18" charset="0"/>
               </a:rPr>
-              <a:t> are neglected, the convolution operation is significantly simplified and allows closed-form analytic solutions for the dc-link current to be developed</a:t>
+              <a:t>simplified and allows closed-form analytic solutions for the dc-link current to be developed</a:t>
             </a:r>
             <a:endParaRPr lang="en-US" dirty="0"/>
           </a:p>

</xml_diff>